<commit_message>
Update Group 27 BETTer Project (2).pptx
</commit_message>
<xml_diff>
--- a/Documentation/Group 27 BETTer Project (2).pptx
+++ b/Documentation/Group 27 BETTer Project (2).pptx
@@ -20,10 +20,10 @@
     <p:sldId id="268" r:id="rId14"/>
     <p:sldId id="269" r:id="rId15"/>
     <p:sldId id="271" r:id="rId16"/>
-    <p:sldId id="270" r:id="rId17"/>
-    <p:sldId id="272" r:id="rId18"/>
-    <p:sldId id="273" r:id="rId19"/>
-    <p:sldId id="274" r:id="rId20"/>
+    <p:sldId id="272" r:id="rId17"/>
+    <p:sldId id="274" r:id="rId18"/>
+    <p:sldId id="270" r:id="rId19"/>
+    <p:sldId id="273" r:id="rId20"/>
     <p:sldId id="275" r:id="rId21"/>
   </p:sldIdLst>
   <p:sldSz cx="12192000" cy="6858000"/>
@@ -125,7 +125,18 @@
   </p:defaultTextStyle>
   <p:extLst>
     <p:ext uri="{EFAFB233-063F-42B5-8137-9DF3F51BA10A}">
-      <p15:sldGuideLst xmlns:p15="http://schemas.microsoft.com/office/powerpoint/2012/main" xmlns=""/>
+      <p15:sldGuideLst xmlns:p15="http://schemas.microsoft.com/office/powerpoint/2012/main">
+        <p15:guide id="1" orient="horz" pos="2160">
+          <p15:clr>
+            <a:srgbClr val="A4A3A4"/>
+          </p15:clr>
+        </p15:guide>
+        <p15:guide id="2" pos="3840">
+          <p15:clr>
+            <a:srgbClr val="A4A3A4"/>
+          </p15:clr>
+        </p15:guide>
+      </p15:sldGuideLst>
     </p:ext>
   </p:extLst>
 </p:presentation>
@@ -6191,7 +6202,7 @@
           <p:cNvPr id="14" name="Picture 3">
             <a:extLst>
               <a:ext uri="{FF2B5EF4-FFF2-40B4-BE49-F238E27FC236}">
-                <a16:creationId xmlns:a16="http://schemas.microsoft.com/office/drawing/2014/main" xmlns="" id="{B77B8BC2-5478-407E-8B5D-2657662D976A}"/>
+                <a16:creationId xmlns:a16="http://schemas.microsoft.com/office/drawing/2014/main" id="{B77B8BC2-5478-407E-8B5D-2657662D976A}"/>
               </a:ext>
             </a:extLst>
           </p:cNvPr>
@@ -6229,10 +6240,10 @@
           <p:cNvPr id="31" name="Group 18">
             <a:extLst>
               <a:ext uri="{FF2B5EF4-FFF2-40B4-BE49-F238E27FC236}">
-                <a16:creationId xmlns:a16="http://schemas.microsoft.com/office/drawing/2014/main" xmlns="" id="{503816F2-40D5-4C23-AF57-063E3923610A}"/>
+                <a16:creationId xmlns:a16="http://schemas.microsoft.com/office/drawing/2014/main" id="{503816F2-40D5-4C23-AF57-063E3923610A}"/>
               </a:ext>
               <a:ext uri="{C183D7F6-B498-43B3-948B-1728B52AA6E4}">
-                <adec:decorative xmlns:adec="http://schemas.microsoft.com/office/drawing/2017/decorative" xmlns="" val="1"/>
+                <adec:decorative xmlns:adec="http://schemas.microsoft.com/office/drawing/2017/decorative" val="1"/>
               </a:ext>
             </a:extLst>
           </p:cNvPr>
@@ -6242,7 +6253,7 @@
           <p:nvPr>
             <p:extLst>
               <p:ext uri="{386F3935-93C4-4BCD-93E2-E3B085C9AB24}">
-                <p16:designElem xmlns:p16="http://schemas.microsoft.com/office/powerpoint/2015/main" xmlns="" val="1"/>
+                <p16:designElem xmlns:p16="http://schemas.microsoft.com/office/powerpoint/2015/main" val="1"/>
               </p:ext>
             </p:extLst>
           </p:nvPr>
@@ -6260,10 +6271,10 @@
             <p:cNvPr id="32" name="Freeform 6">
               <a:extLst>
                 <a:ext uri="{FF2B5EF4-FFF2-40B4-BE49-F238E27FC236}">
-                  <a16:creationId xmlns:a16="http://schemas.microsoft.com/office/drawing/2014/main" xmlns="" id="{DBF222D0-66E9-48F8-B249-75AF858DFD1E}"/>
+                  <a16:creationId xmlns:a16="http://schemas.microsoft.com/office/drawing/2014/main" id="{DBF222D0-66E9-48F8-B249-75AF858DFD1E}"/>
                 </a:ext>
                 <a:ext uri="{C183D7F6-B498-43B3-948B-1728B52AA6E4}">
-                  <adec:decorative xmlns:adec="http://schemas.microsoft.com/office/drawing/2017/decorative" xmlns="" val="1"/>
+                  <adec:decorative xmlns:adec="http://schemas.microsoft.com/office/drawing/2017/decorative" val="1"/>
                 </a:ext>
               </a:extLst>
             </p:cNvPr>
@@ -6271,7 +6282,7 @@
             <p:nvPr>
               <p:extLst>
                 <p:ext uri="{386F3935-93C4-4BCD-93E2-E3B085C9AB24}">
-                  <p16:designElem xmlns:p16="http://schemas.microsoft.com/office/powerpoint/2015/main" xmlns="" val="1"/>
+                  <p16:designElem xmlns:p16="http://schemas.microsoft.com/office/powerpoint/2015/main" val="1"/>
                 </p:ext>
               </p:extLst>
             </p:nvPr>
@@ -6321,10 +6332,10 @@
             <p:cNvPr id="33" name="Freeform 7">
               <a:extLst>
                 <a:ext uri="{FF2B5EF4-FFF2-40B4-BE49-F238E27FC236}">
-                  <a16:creationId xmlns:a16="http://schemas.microsoft.com/office/drawing/2014/main" xmlns="" id="{5312FABD-B1AF-4E20-A8BF-0A6F0C42C8BE}"/>
+                  <a16:creationId xmlns:a16="http://schemas.microsoft.com/office/drawing/2014/main" id="{5312FABD-B1AF-4E20-A8BF-0A6F0C42C8BE}"/>
                 </a:ext>
                 <a:ext uri="{C183D7F6-B498-43B3-948B-1728B52AA6E4}">
-                  <adec:decorative xmlns:adec="http://schemas.microsoft.com/office/drawing/2017/decorative" xmlns="" val="1"/>
+                  <adec:decorative xmlns:adec="http://schemas.microsoft.com/office/drawing/2017/decorative" val="1"/>
                 </a:ext>
               </a:extLst>
             </p:cNvPr>
@@ -6332,7 +6343,7 @@
             <p:nvPr>
               <p:extLst>
                 <p:ext uri="{386F3935-93C4-4BCD-93E2-E3B085C9AB24}">
-                  <p16:designElem xmlns:p16="http://schemas.microsoft.com/office/powerpoint/2015/main" xmlns="" val="1"/>
+                  <p16:designElem xmlns:p16="http://schemas.microsoft.com/office/powerpoint/2015/main" val="1"/>
                 </p:ext>
               </p:extLst>
             </p:nvPr>
@@ -6388,10 +6399,10 @@
             <p:cNvPr id="22" name="Freeform 9">
               <a:extLst>
                 <a:ext uri="{FF2B5EF4-FFF2-40B4-BE49-F238E27FC236}">
-                  <a16:creationId xmlns:a16="http://schemas.microsoft.com/office/drawing/2014/main" xmlns="" id="{E6E2E6E5-F3C0-4B1A-8CEF-1F057A280403}"/>
+                  <a16:creationId xmlns:a16="http://schemas.microsoft.com/office/drawing/2014/main" id="{E6E2E6E5-F3C0-4B1A-8CEF-1F057A280403}"/>
                 </a:ext>
                 <a:ext uri="{C183D7F6-B498-43B3-948B-1728B52AA6E4}">
-                  <adec:decorative xmlns:adec="http://schemas.microsoft.com/office/drawing/2017/decorative" xmlns="" val="1"/>
+                  <adec:decorative xmlns:adec="http://schemas.microsoft.com/office/drawing/2017/decorative" val="1"/>
                 </a:ext>
               </a:extLst>
             </p:cNvPr>
@@ -6399,7 +6410,7 @@
             <p:nvPr>
               <p:extLst>
                 <p:ext uri="{386F3935-93C4-4BCD-93E2-E3B085C9AB24}">
-                  <p16:designElem xmlns:p16="http://schemas.microsoft.com/office/powerpoint/2015/main" xmlns="" val="1"/>
+                  <p16:designElem xmlns:p16="http://schemas.microsoft.com/office/powerpoint/2015/main" val="1"/>
                 </p:ext>
               </p:extLst>
             </p:nvPr>
@@ -6449,10 +6460,10 @@
             <p:cNvPr id="34" name="Freeform 10">
               <a:extLst>
                 <a:ext uri="{FF2B5EF4-FFF2-40B4-BE49-F238E27FC236}">
-                  <a16:creationId xmlns:a16="http://schemas.microsoft.com/office/drawing/2014/main" xmlns="" id="{850A45DB-9259-4551-88A8-0D3D3E4FD460}"/>
+                  <a16:creationId xmlns:a16="http://schemas.microsoft.com/office/drawing/2014/main" id="{850A45DB-9259-4551-88A8-0D3D3E4FD460}"/>
                 </a:ext>
                 <a:ext uri="{C183D7F6-B498-43B3-948B-1728B52AA6E4}">
-                  <adec:decorative xmlns:adec="http://schemas.microsoft.com/office/drawing/2017/decorative" xmlns="" val="1"/>
+                  <adec:decorative xmlns:adec="http://schemas.microsoft.com/office/drawing/2017/decorative" val="1"/>
                 </a:ext>
               </a:extLst>
             </p:cNvPr>
@@ -6460,7 +6471,7 @@
             <p:nvPr>
               <p:extLst>
                 <p:ext uri="{386F3935-93C4-4BCD-93E2-E3B085C9AB24}">
-                  <p16:designElem xmlns:p16="http://schemas.microsoft.com/office/powerpoint/2015/main" xmlns="" val="1"/>
+                  <p16:designElem xmlns:p16="http://schemas.microsoft.com/office/powerpoint/2015/main" val="1"/>
                 </p:ext>
               </p:extLst>
             </p:nvPr>
@@ -6509,10 +6520,10 @@
             <p:cNvPr id="24" name="Freeform 11">
               <a:extLst>
                 <a:ext uri="{FF2B5EF4-FFF2-40B4-BE49-F238E27FC236}">
-                  <a16:creationId xmlns:a16="http://schemas.microsoft.com/office/drawing/2014/main" xmlns="" id="{615A3848-AC67-4C67-A516-2823179F071D}"/>
+                  <a16:creationId xmlns:a16="http://schemas.microsoft.com/office/drawing/2014/main" id="{615A3848-AC67-4C67-A516-2823179F071D}"/>
                 </a:ext>
                 <a:ext uri="{C183D7F6-B498-43B3-948B-1728B52AA6E4}">
-                  <adec:decorative xmlns:adec="http://schemas.microsoft.com/office/drawing/2017/decorative" xmlns="" val="1"/>
+                  <adec:decorative xmlns:adec="http://schemas.microsoft.com/office/drawing/2017/decorative" val="1"/>
                 </a:ext>
               </a:extLst>
             </p:cNvPr>
@@ -6520,7 +6531,7 @@
             <p:nvPr>
               <p:extLst>
                 <p:ext uri="{386F3935-93C4-4BCD-93E2-E3B085C9AB24}">
-                  <p16:designElem xmlns:p16="http://schemas.microsoft.com/office/powerpoint/2015/main" xmlns="" val="1"/>
+                  <p16:designElem xmlns:p16="http://schemas.microsoft.com/office/powerpoint/2015/main" val="1"/>
                 </p:ext>
               </p:extLst>
             </p:nvPr>
@@ -6575,10 +6586,10 @@
             <p:cNvPr id="25" name="Freeform 12">
               <a:extLst>
                 <a:ext uri="{FF2B5EF4-FFF2-40B4-BE49-F238E27FC236}">
-                  <a16:creationId xmlns:a16="http://schemas.microsoft.com/office/drawing/2014/main" xmlns="" id="{13BA5F40-CE6A-44DD-BBCE-EA36A12F39AC}"/>
+                  <a16:creationId xmlns:a16="http://schemas.microsoft.com/office/drawing/2014/main" id="{13BA5F40-CE6A-44DD-BBCE-EA36A12F39AC}"/>
                 </a:ext>
                 <a:ext uri="{C183D7F6-B498-43B3-948B-1728B52AA6E4}">
-                  <adec:decorative xmlns:adec="http://schemas.microsoft.com/office/drawing/2017/decorative" xmlns="" val="1"/>
+                  <adec:decorative xmlns:adec="http://schemas.microsoft.com/office/drawing/2017/decorative" val="1"/>
                 </a:ext>
               </a:extLst>
             </p:cNvPr>
@@ -6586,7 +6597,7 @@
             <p:nvPr>
               <p:extLst>
                 <p:ext uri="{386F3935-93C4-4BCD-93E2-E3B085C9AB24}">
-                  <p16:designElem xmlns:p16="http://schemas.microsoft.com/office/powerpoint/2015/main" xmlns="" val="1"/>
+                  <p16:designElem xmlns:p16="http://schemas.microsoft.com/office/powerpoint/2015/main" val="1"/>
                 </p:ext>
               </p:extLst>
             </p:nvPr>
@@ -6649,7 +6660,7 @@
           <p:cNvPr id="2" name="Title 1">
             <a:extLst>
               <a:ext uri="{FF2B5EF4-FFF2-40B4-BE49-F238E27FC236}">
-                <a16:creationId xmlns:a16="http://schemas.microsoft.com/office/drawing/2014/main" xmlns="" id="{6D015DFF-93D0-4CC4-A1A3-4E8163CFEA61}"/>
+                <a16:creationId xmlns:a16="http://schemas.microsoft.com/office/drawing/2014/main" id="{6D015DFF-93D0-4CC4-A1A3-4E8163CFEA61}"/>
               </a:ext>
             </a:extLst>
           </p:cNvPr>
@@ -6685,7 +6696,7 @@
           <p:cNvPr id="3" name="Subtitle 2">
             <a:extLst>
               <a:ext uri="{FF2B5EF4-FFF2-40B4-BE49-F238E27FC236}">
-                <a16:creationId xmlns:a16="http://schemas.microsoft.com/office/drawing/2014/main" xmlns="" id="{7E76867A-D5A6-4F75-AE60-F39F98984C9E}"/>
+                <a16:creationId xmlns:a16="http://schemas.microsoft.com/office/drawing/2014/main" id="{7E76867A-D5A6-4F75-AE60-F39F98984C9E}"/>
               </a:ext>
             </a:extLst>
           </p:cNvPr>
@@ -6763,7 +6774,7 @@
           <p:cNvPr id="2" name="Title 1">
             <a:extLst>
               <a:ext uri="{FF2B5EF4-FFF2-40B4-BE49-F238E27FC236}">
-                <a16:creationId xmlns:a16="http://schemas.microsoft.com/office/drawing/2014/main" xmlns="" id="{6723D0A3-DBDA-43F2-8B92-B2AF8FC3F3C4}"/>
+                <a16:creationId xmlns:a16="http://schemas.microsoft.com/office/drawing/2014/main" id="{6723D0A3-DBDA-43F2-8B92-B2AF8FC3F3C4}"/>
               </a:ext>
             </a:extLst>
           </p:cNvPr>
@@ -6791,7 +6802,7 @@
           <p:cNvPr id="3" name="Content Placeholder 2">
             <a:extLst>
               <a:ext uri="{FF2B5EF4-FFF2-40B4-BE49-F238E27FC236}">
-                <a16:creationId xmlns:a16="http://schemas.microsoft.com/office/drawing/2014/main" xmlns="" id="{4F039096-85DD-4A40-9B17-DC57A8F9BEED}"/>
+                <a16:creationId xmlns:a16="http://schemas.microsoft.com/office/drawing/2014/main" id="{4F039096-85DD-4A40-9B17-DC57A8F9BEED}"/>
               </a:ext>
             </a:extLst>
           </p:cNvPr>
@@ -6844,7 +6855,7 @@
           <p:cNvPr id="4" name="TextBox 3">
             <a:extLst>
               <a:ext uri="{FF2B5EF4-FFF2-40B4-BE49-F238E27FC236}">
-                <a16:creationId xmlns:a16="http://schemas.microsoft.com/office/drawing/2014/main" xmlns="" id="{299F70BC-1606-4E3B-A1D7-97021F95C020}"/>
+                <a16:creationId xmlns:a16="http://schemas.microsoft.com/office/drawing/2014/main" id="{299F70BC-1606-4E3B-A1D7-97021F95C020}"/>
               </a:ext>
             </a:extLst>
           </p:cNvPr>
@@ -6879,7 +6890,7 @@
           <p:cNvPr id="5" name="Picture 4">
             <a:extLst>
               <a:ext uri="{FF2B5EF4-FFF2-40B4-BE49-F238E27FC236}">
-                <a16:creationId xmlns:a16="http://schemas.microsoft.com/office/drawing/2014/main" xmlns="" id="{72168E45-79C0-4AB8-B20E-5050F2CB87C3}"/>
+                <a16:creationId xmlns:a16="http://schemas.microsoft.com/office/drawing/2014/main" id="{72168E45-79C0-4AB8-B20E-5050F2CB87C3}"/>
               </a:ext>
             </a:extLst>
           </p:cNvPr>
@@ -6939,7 +6950,7 @@
           <p:cNvPr id="2" name="Title 1">
             <a:extLst>
               <a:ext uri="{FF2B5EF4-FFF2-40B4-BE49-F238E27FC236}">
-                <a16:creationId xmlns:a16="http://schemas.microsoft.com/office/drawing/2014/main" xmlns="" id="{848CF6C4-99D2-4AD7-B9F5-526D0098E04A}"/>
+                <a16:creationId xmlns:a16="http://schemas.microsoft.com/office/drawing/2014/main" id="{848CF6C4-99D2-4AD7-B9F5-526D0098E04A}"/>
               </a:ext>
             </a:extLst>
           </p:cNvPr>
@@ -6967,7 +6978,7 @@
           <p:cNvPr id="3" name="Content Placeholder 2">
             <a:extLst>
               <a:ext uri="{FF2B5EF4-FFF2-40B4-BE49-F238E27FC236}">
-                <a16:creationId xmlns:a16="http://schemas.microsoft.com/office/drawing/2014/main" xmlns="" id="{50A4B961-2BF7-4A37-BB59-58DE3B992D29}"/>
+                <a16:creationId xmlns:a16="http://schemas.microsoft.com/office/drawing/2014/main" id="{50A4B961-2BF7-4A37-BB59-58DE3B992D29}"/>
               </a:ext>
             </a:extLst>
           </p:cNvPr>
@@ -7021,7 +7032,7 @@
           <p:cNvPr id="4" name="TextBox 3">
             <a:extLst>
               <a:ext uri="{FF2B5EF4-FFF2-40B4-BE49-F238E27FC236}">
-                <a16:creationId xmlns:a16="http://schemas.microsoft.com/office/drawing/2014/main" xmlns="" id="{81CEB725-A51D-4EEF-903C-EB0C6CB722DD}"/>
+                <a16:creationId xmlns:a16="http://schemas.microsoft.com/office/drawing/2014/main" id="{81CEB725-A51D-4EEF-903C-EB0C6CB722DD}"/>
               </a:ext>
             </a:extLst>
           </p:cNvPr>
@@ -7086,7 +7097,7 @@
           <p:cNvPr id="2" name="Title 1">
             <a:extLst>
               <a:ext uri="{FF2B5EF4-FFF2-40B4-BE49-F238E27FC236}">
-                <a16:creationId xmlns:a16="http://schemas.microsoft.com/office/drawing/2014/main" xmlns="" id="{C56880EB-A35D-49FE-951D-F778D7D796A2}"/>
+                <a16:creationId xmlns:a16="http://schemas.microsoft.com/office/drawing/2014/main" id="{C56880EB-A35D-49FE-951D-F778D7D796A2}"/>
               </a:ext>
             </a:extLst>
           </p:cNvPr>
@@ -7114,7 +7125,7 @@
           <p:cNvPr id="3" name="Content Placeholder 2">
             <a:extLst>
               <a:ext uri="{FF2B5EF4-FFF2-40B4-BE49-F238E27FC236}">
-                <a16:creationId xmlns:a16="http://schemas.microsoft.com/office/drawing/2014/main" xmlns="" id="{8287F86C-39EA-42E7-9F8B-AF1406BF8213}"/>
+                <a16:creationId xmlns:a16="http://schemas.microsoft.com/office/drawing/2014/main" id="{8287F86C-39EA-42E7-9F8B-AF1406BF8213}"/>
               </a:ext>
             </a:extLst>
           </p:cNvPr>
@@ -7147,7 +7158,7 @@
           <p:cNvPr id="4" name="TextBox 3">
             <a:extLst>
               <a:ext uri="{FF2B5EF4-FFF2-40B4-BE49-F238E27FC236}">
-                <a16:creationId xmlns:a16="http://schemas.microsoft.com/office/drawing/2014/main" xmlns="" id="{640BA6D7-921A-4647-B1F6-5AE50E6B8566}"/>
+                <a16:creationId xmlns:a16="http://schemas.microsoft.com/office/drawing/2014/main" id="{640BA6D7-921A-4647-B1F6-5AE50E6B8566}"/>
               </a:ext>
             </a:extLst>
           </p:cNvPr>
@@ -7212,7 +7223,7 @@
           <p:cNvPr id="2" name="Title 1">
             <a:extLst>
               <a:ext uri="{FF2B5EF4-FFF2-40B4-BE49-F238E27FC236}">
-                <a16:creationId xmlns:a16="http://schemas.microsoft.com/office/drawing/2014/main" xmlns="" id="{B951E17A-3A8C-4416-AF25-DB8C41B40364}"/>
+                <a16:creationId xmlns:a16="http://schemas.microsoft.com/office/drawing/2014/main" id="{B951E17A-3A8C-4416-AF25-DB8C41B40364}"/>
               </a:ext>
             </a:extLst>
           </p:cNvPr>
@@ -7240,7 +7251,7 @@
           <p:cNvPr id="3" name="Content Placeholder 2">
             <a:extLst>
               <a:ext uri="{FF2B5EF4-FFF2-40B4-BE49-F238E27FC236}">
-                <a16:creationId xmlns:a16="http://schemas.microsoft.com/office/drawing/2014/main" xmlns="" id="{FEBE4A65-E0FD-4D9F-83F7-29E31C4CCA0B}"/>
+                <a16:creationId xmlns:a16="http://schemas.microsoft.com/office/drawing/2014/main" id="{FEBE4A65-E0FD-4D9F-83F7-29E31C4CCA0B}"/>
               </a:ext>
             </a:extLst>
           </p:cNvPr>
@@ -7273,7 +7284,7 @@
           <p:cNvPr id="4" name="TextBox 3">
             <a:extLst>
               <a:ext uri="{FF2B5EF4-FFF2-40B4-BE49-F238E27FC236}">
-                <a16:creationId xmlns:a16="http://schemas.microsoft.com/office/drawing/2014/main" xmlns="" id="{0EBC278E-EA76-4DEB-B27E-7CB79B7413B8}"/>
+                <a16:creationId xmlns:a16="http://schemas.microsoft.com/office/drawing/2014/main" id="{0EBC278E-EA76-4DEB-B27E-7CB79B7413B8}"/>
               </a:ext>
             </a:extLst>
           </p:cNvPr>
@@ -7338,7 +7349,7 @@
           <p:cNvPr id="2" name="Title 1">
             <a:extLst>
               <a:ext uri="{FF2B5EF4-FFF2-40B4-BE49-F238E27FC236}">
-                <a16:creationId xmlns:a16="http://schemas.microsoft.com/office/drawing/2014/main" xmlns="" id="{5324F84D-0E7D-455E-A6F2-848AB83D7D3C}"/>
+                <a16:creationId xmlns:a16="http://schemas.microsoft.com/office/drawing/2014/main" id="{5324F84D-0E7D-455E-A6F2-848AB83D7D3C}"/>
               </a:ext>
             </a:extLst>
           </p:cNvPr>
@@ -7366,7 +7377,7 @@
           <p:cNvPr id="3" name="Content Placeholder 2">
             <a:extLst>
               <a:ext uri="{FF2B5EF4-FFF2-40B4-BE49-F238E27FC236}">
-                <a16:creationId xmlns:a16="http://schemas.microsoft.com/office/drawing/2014/main" xmlns="" id="{A82ADB28-14AF-44BC-B1F3-F3FF60F46C4D}"/>
+                <a16:creationId xmlns:a16="http://schemas.microsoft.com/office/drawing/2014/main" id="{A82ADB28-14AF-44BC-B1F3-F3FF60F46C4D}"/>
               </a:ext>
             </a:extLst>
           </p:cNvPr>
@@ -7459,7 +7470,7 @@
           <p:cNvPr id="2" name="Title 1">
             <a:extLst>
               <a:ext uri="{FF2B5EF4-FFF2-40B4-BE49-F238E27FC236}">
-                <a16:creationId xmlns:a16="http://schemas.microsoft.com/office/drawing/2014/main" xmlns="" id="{E47A5E69-3624-4346-A06F-0DB9E66CD9BA}"/>
+                <a16:creationId xmlns:a16="http://schemas.microsoft.com/office/drawing/2014/main" id="{E47A5E69-3624-4346-A06F-0DB9E66CD9BA}"/>
               </a:ext>
             </a:extLst>
           </p:cNvPr>
@@ -7487,7 +7498,7 @@
           <p:cNvPr id="3" name="Content Placeholder 2">
             <a:extLst>
               <a:ext uri="{FF2B5EF4-FFF2-40B4-BE49-F238E27FC236}">
-                <a16:creationId xmlns:a16="http://schemas.microsoft.com/office/drawing/2014/main" xmlns="" id="{FFB17EB2-9666-410C-8E69-0F0DCDA0B234}"/>
+                <a16:creationId xmlns:a16="http://schemas.microsoft.com/office/drawing/2014/main" id="{FFB17EB2-9666-410C-8E69-0F0DCDA0B234}"/>
               </a:ext>
             </a:extLst>
           </p:cNvPr>
@@ -7548,10 +7559,10 @@
       </p:grpSpPr>
       <p:sp>
         <p:nvSpPr>
-          <p:cNvPr id="2" name="Title 1">
+          <p:cNvPr id="3" name="Content Placeholder 2">
             <a:extLst>
               <a:ext uri="{FF2B5EF4-FFF2-40B4-BE49-F238E27FC236}">
-                <a16:creationId xmlns:a16="http://schemas.microsoft.com/office/drawing/2014/main" xmlns="" id="{4DB3B1D1-38CD-B04D-90AB-6FF09EB4513E}"/>
+                <a16:creationId xmlns:a16="http://schemas.microsoft.com/office/drawing/2014/main" id="{42C43351-1F65-4C2D-B695-9AD1B2D55566}"/>
               </a:ext>
             </a:extLst>
           </p:cNvPr>
@@ -7559,66 +7570,182 @@
             <a:spLocks noGrp="1"/>
           </p:cNvSpPr>
           <p:nvPr>
-            <p:ph type="title"/>
+            <p:ph idx="1"/>
           </p:nvPr>
         </p:nvSpPr>
         <p:spPr/>
         <p:txBody>
-          <a:bodyPr/>
+          <a:bodyPr>
+            <a:normAutofit fontScale="85000" lnSpcReduction="20000"/>
+          </a:bodyPr>
           <a:lstStyle/>
           <a:p>
             <a:r>
               <a:rPr lang="en-GB" dirty="0"/>
-              <a:t>Felipe Cardoso - Contributions</a:t>
-            </a:r>
-            <a:endParaRPr lang="en-US" dirty="0"/>
-          </a:p>
-        </p:txBody>
-      </p:sp>
-      <p:sp>
-        <p:nvSpPr>
-          <p:cNvPr id="3" name="Content Placeholder 2">
+              <a:t>Created database of the app</a:t>
+            </a:r>
+          </a:p>
+          <a:p>
+            <a:r>
+              <a:rPr lang="en-GB" dirty="0"/>
+              <a:t>Scraped data for the database</a:t>
+            </a:r>
+          </a:p>
+          <a:p>
+            <a:r>
+              <a:rPr lang="en-GB" dirty="0"/>
+              <a:t>Design the Database UML Diagram</a:t>
+            </a:r>
+          </a:p>
+          <a:p>
+            <a:r>
+              <a:rPr lang="en-GB" dirty="0"/>
+              <a:t>Database created for storing timetables info and user info</a:t>
+            </a:r>
+          </a:p>
+          <a:p>
+            <a:r>
+              <a:rPr lang="en-GB" dirty="0"/>
+              <a:t>Coded implementation of database (timetable and user login)</a:t>
+            </a:r>
+          </a:p>
+          <a:p>
+            <a:r>
+              <a:rPr lang="en-GB" dirty="0"/>
+              <a:t>Designed leaflet for marketing</a:t>
+            </a:r>
+          </a:p>
+          <a:p>
+            <a:r>
+              <a:rPr lang="en-GB" dirty="0"/>
+              <a:t>Testing of the App</a:t>
+            </a:r>
+          </a:p>
+          <a:p>
+            <a:r>
+              <a:rPr lang="en-GB" dirty="0"/>
+              <a:t>App suggestion were made</a:t>
+            </a:r>
+          </a:p>
+        </p:txBody>
+      </p:sp>
+      <p:sp>
+        <p:nvSpPr>
+          <p:cNvPr id="4" name="Title 1">
             <a:extLst>
               <a:ext uri="{FF2B5EF4-FFF2-40B4-BE49-F238E27FC236}">
-                <a16:creationId xmlns:a16="http://schemas.microsoft.com/office/drawing/2014/main" xmlns="" id="{D7B8B550-7412-9F4E-BF4D-500C6F52CE96}"/>
+                <a16:creationId xmlns:a16="http://schemas.microsoft.com/office/drawing/2014/main" id="{D162523B-5FC2-4520-90FA-3C6CDFCE285B}"/>
               </a:ext>
             </a:extLst>
           </p:cNvPr>
-          <p:cNvSpPr>
-            <a:spLocks noGrp="1"/>
-          </p:cNvSpPr>
-          <p:nvPr>
-            <p:ph idx="1"/>
-          </p:nvPr>
-        </p:nvSpPr>
-        <p:spPr/>
-        <p:txBody>
-          <a:bodyPr/>
-          <a:lstStyle/>
-          <a:p>
-            <a:r>
-              <a:rPr lang="en-US" dirty="0"/>
-              <a:t>Terms and Conditions for the app</a:t>
-            </a:r>
-          </a:p>
-          <a:p>
-            <a:r>
-              <a:rPr lang="en-US" dirty="0"/>
-              <a:t>Questionnaire for the extra features</a:t>
-            </a:r>
-          </a:p>
-          <a:p>
-            <a:r>
-              <a:rPr lang="en-US" dirty="0"/>
-              <a:t>Tried to do forgotten password</a:t>
-            </a:r>
+          <p:cNvSpPr txBox="1">
+            <a:spLocks/>
+          </p:cNvSpPr>
+          <p:nvPr/>
+        </p:nvSpPr>
+        <p:spPr>
+          <a:xfrm>
+            <a:off x="1636711" y="838200"/>
+            <a:ext cx="10018713" cy="1752599"/>
+          </a:xfrm>
+          <a:prstGeom prst="rect">
+            <a:avLst/>
+          </a:prstGeom>
+          <a:effectLst/>
+        </p:spPr>
+        <p:txBody>
+          <a:bodyPr vert="horz" lIns="91440" tIns="45720" rIns="91440" bIns="45720" rtlCol="0" anchor="ctr">
+            <a:normAutofit/>
+          </a:bodyPr>
+          <a:lstStyle>
+            <a:lvl1pPr algn="ctr" defTabSz="457200" rtl="0" eaLnBrk="1" latinLnBrk="0" hangingPunct="1">
+              <a:spcBef>
+                <a:spcPct val="0"/>
+              </a:spcBef>
+              <a:buNone/>
+              <a:defRPr sz="4000" kern="1200" cap="none">
+                <a:ln w="3175" cmpd="sng">
+                  <a:noFill/>
+                </a:ln>
+                <a:solidFill>
+                  <a:schemeClr val="tx1"/>
+                </a:solidFill>
+                <a:effectLst/>
+                <a:latin typeface="+mj-lt"/>
+                <a:ea typeface="+mj-ea"/>
+                <a:cs typeface="+mj-cs"/>
+              </a:defRPr>
+            </a:lvl1pPr>
+            <a:lvl2pPr eaLnBrk="1" hangingPunct="1">
+              <a:defRPr>
+                <a:solidFill>
+                  <a:schemeClr val="tx2"/>
+                </a:solidFill>
+              </a:defRPr>
+            </a:lvl2pPr>
+            <a:lvl3pPr eaLnBrk="1" hangingPunct="1">
+              <a:defRPr>
+                <a:solidFill>
+                  <a:schemeClr val="tx2"/>
+                </a:solidFill>
+              </a:defRPr>
+            </a:lvl3pPr>
+            <a:lvl4pPr eaLnBrk="1" hangingPunct="1">
+              <a:defRPr>
+                <a:solidFill>
+                  <a:schemeClr val="tx2"/>
+                </a:solidFill>
+              </a:defRPr>
+            </a:lvl4pPr>
+            <a:lvl5pPr eaLnBrk="1" hangingPunct="1">
+              <a:defRPr>
+                <a:solidFill>
+                  <a:schemeClr val="tx2"/>
+                </a:solidFill>
+              </a:defRPr>
+            </a:lvl5pPr>
+            <a:lvl6pPr eaLnBrk="1" hangingPunct="1">
+              <a:defRPr>
+                <a:solidFill>
+                  <a:schemeClr val="tx2"/>
+                </a:solidFill>
+              </a:defRPr>
+            </a:lvl6pPr>
+            <a:lvl7pPr eaLnBrk="1" hangingPunct="1">
+              <a:defRPr>
+                <a:solidFill>
+                  <a:schemeClr val="tx2"/>
+                </a:solidFill>
+              </a:defRPr>
+            </a:lvl7pPr>
+            <a:lvl8pPr eaLnBrk="1" hangingPunct="1">
+              <a:defRPr>
+                <a:solidFill>
+                  <a:schemeClr val="tx2"/>
+                </a:solidFill>
+              </a:defRPr>
+            </a:lvl8pPr>
+            <a:lvl9pPr eaLnBrk="1" hangingPunct="1">
+              <a:defRPr>
+                <a:solidFill>
+                  <a:schemeClr val="tx2"/>
+                </a:solidFill>
+              </a:defRPr>
+            </a:lvl9pPr>
+          </a:lstStyle>
+          <a:p>
+            <a:r>
+              <a:rPr lang="en-GB" dirty="0"/>
+              <a:t>Pruthvi Lalji - Contributions</a:t>
+            </a:r>
+            <a:endParaRPr lang="en-US" dirty="0"/>
           </a:p>
         </p:txBody>
       </p:sp>
     </p:spTree>
     <p:extLst>
       <p:ext uri="{BB962C8B-B14F-4D97-AF65-F5344CB8AC3E}">
-        <p14:creationId xmlns:p14="http://schemas.microsoft.com/office/powerpoint/2010/main" val="50700724"/>
+        <p14:creationId xmlns:p14="http://schemas.microsoft.com/office/powerpoint/2010/main" val="2108857020"/>
       </p:ext>
     </p:extLst>
   </p:cSld>
@@ -7647,10 +7774,10 @@
       </p:grpSpPr>
       <p:sp>
         <p:nvSpPr>
-          <p:cNvPr id="3" name="Content Placeholder 2">
+          <p:cNvPr id="6" name="Content Placeholder 2">
             <a:extLst>
               <a:ext uri="{FF2B5EF4-FFF2-40B4-BE49-F238E27FC236}">
-                <a16:creationId xmlns:a16="http://schemas.microsoft.com/office/drawing/2014/main" xmlns="" id="{42C43351-1F65-4C2D-B695-9AD1B2D55566}"/>
+                <a16:creationId xmlns:a16="http://schemas.microsoft.com/office/drawing/2014/main" id="{5DAF16B0-D37E-49FA-A8D2-E01E64B2DD62}"/>
               </a:ext>
             </a:extLst>
           </p:cNvPr>
@@ -7661,68 +7788,61 @@
             <p:ph idx="1"/>
           </p:nvPr>
         </p:nvSpPr>
-        <p:spPr/>
+        <p:spPr>
+          <a:xfrm>
+            <a:off x="1484310" y="2666999"/>
+            <a:ext cx="10018713" cy="3124201"/>
+          </a:xfrm>
+        </p:spPr>
         <p:txBody>
           <a:bodyPr>
-            <a:normAutofit fontScale="85000" lnSpcReduction="20000"/>
+            <a:normAutofit/>
           </a:bodyPr>
           <a:lstStyle/>
           <a:p>
             <a:r>
               <a:rPr lang="en-GB" dirty="0"/>
-              <a:t>Created Backend of the app</a:t>
+              <a:t>Created Front End of the App</a:t>
             </a:r>
           </a:p>
           <a:p>
             <a:r>
               <a:rPr lang="en-GB" dirty="0"/>
-              <a:t>Scraped data for the database</a:t>
+              <a:t>Designed Class Diagram for the system</a:t>
             </a:r>
           </a:p>
           <a:p>
             <a:r>
               <a:rPr lang="en-GB" dirty="0"/>
-              <a:t>Design the Database UML Diagram</a:t>
+              <a:t>Coded the home page class (display timetable)</a:t>
             </a:r>
           </a:p>
           <a:p>
             <a:r>
               <a:rPr lang="en-GB" dirty="0"/>
-              <a:t>Database created for storing timetables info and user info</a:t>
+              <a:t>Coded Map feature of the app</a:t>
             </a:r>
           </a:p>
           <a:p>
             <a:r>
               <a:rPr lang="en-GB" dirty="0"/>
-              <a:t>Coded implementation of database (timetable and user login)</a:t>
-            </a:r>
-          </a:p>
-          <a:p>
-            <a:r>
-              <a:rPr lang="en-GB" dirty="0"/>
-              <a:t>Designed leaflet for marketing</a:t>
-            </a:r>
-          </a:p>
-          <a:p>
-            <a:r>
-              <a:rPr lang="en-GB" dirty="0"/>
-              <a:t>Testing of the App</a:t>
-            </a:r>
-          </a:p>
-          <a:p>
-            <a:r>
-              <a:rPr lang="en-GB" dirty="0"/>
-              <a:t>App suggestion were made</a:t>
-            </a:r>
-          </a:p>
-        </p:txBody>
-      </p:sp>
-      <p:sp>
-        <p:nvSpPr>
-          <p:cNvPr id="4" name="Title 1">
+              <a:t>Currently working on local database (Shared Preferences)</a:t>
+            </a:r>
+          </a:p>
+          <a:p>
+            <a:endParaRPr lang="en-GB" dirty="0"/>
+          </a:p>
+          <a:p>
+            <a:endParaRPr lang="en-GB" dirty="0"/>
+          </a:p>
+        </p:txBody>
+      </p:sp>
+      <p:sp>
+        <p:nvSpPr>
+          <p:cNvPr id="7" name="Title 1">
             <a:extLst>
               <a:ext uri="{FF2B5EF4-FFF2-40B4-BE49-F238E27FC236}">
-                <a16:creationId xmlns:a16="http://schemas.microsoft.com/office/drawing/2014/main" xmlns="" id="{D162523B-5FC2-4520-90FA-3C6CDFCE285B}"/>
+                <a16:creationId xmlns:a16="http://schemas.microsoft.com/office/drawing/2014/main" id="{C419FCE0-6FCF-48A0-A380-503FFCF48BC5}"/>
               </a:ext>
             </a:extLst>
           </p:cNvPr>
@@ -7824,7 +7944,7 @@
           <a:p>
             <a:r>
               <a:rPr lang="en-GB" dirty="0"/>
-              <a:t>Pruthvi Lalji - Contributions</a:t>
+              <a:t>Anas Zouhir - Contributions</a:t>
             </a:r>
             <a:endParaRPr lang="en-US" dirty="0"/>
           </a:p>
@@ -7833,7 +7953,7 @@
     </p:spTree>
     <p:extLst>
       <p:ext uri="{BB962C8B-B14F-4D97-AF65-F5344CB8AC3E}">
-        <p14:creationId xmlns:p14="http://schemas.microsoft.com/office/powerpoint/2010/main" val="2108857020"/>
+        <p14:creationId xmlns:p14="http://schemas.microsoft.com/office/powerpoint/2010/main" val="2018138498"/>
       </p:ext>
     </p:extLst>
   </p:cSld>
@@ -7862,10 +7982,10 @@
       </p:grpSpPr>
       <p:sp>
         <p:nvSpPr>
-          <p:cNvPr id="6" name="Content Placeholder 2">
+          <p:cNvPr id="2" name="Title 1">
             <a:extLst>
               <a:ext uri="{FF2B5EF4-FFF2-40B4-BE49-F238E27FC236}">
-                <a16:creationId xmlns:a16="http://schemas.microsoft.com/office/drawing/2014/main" xmlns="" id="{5DAF16B0-D37E-49FA-A8D2-E01E64B2DD62}"/>
+                <a16:creationId xmlns:a16="http://schemas.microsoft.com/office/drawing/2014/main" id="{4DB3B1D1-38CD-B04D-90AB-6FF09EB4513E}"/>
               </a:ext>
             </a:extLst>
           </p:cNvPr>
@@ -7873,160 +7993,66 @@
             <a:spLocks noGrp="1"/>
           </p:cNvSpPr>
           <p:nvPr>
-            <p:ph idx="1"/>
-          </p:nvPr>
-        </p:nvSpPr>
-        <p:spPr>
-          <a:xfrm>
-            <a:off x="1484310" y="2666999"/>
-            <a:ext cx="10018713" cy="3124201"/>
-          </a:xfrm>
-        </p:spPr>
-        <p:txBody>
-          <a:bodyPr>
-            <a:normAutofit/>
-          </a:bodyPr>
+            <p:ph type="title"/>
+          </p:nvPr>
+        </p:nvSpPr>
+        <p:spPr/>
+        <p:txBody>
+          <a:bodyPr/>
           <a:lstStyle/>
           <a:p>
             <a:r>
               <a:rPr lang="en-GB" dirty="0"/>
-              <a:t>Wrote risk analysis for the project</a:t>
-            </a:r>
-          </a:p>
-          <a:p>
-            <a:r>
-              <a:rPr lang="en-GB" dirty="0"/>
-              <a:t>Implemented terms of service &amp; privacy policy on app</a:t>
-            </a:r>
-          </a:p>
-          <a:p>
-            <a:r>
-              <a:rPr lang="en-GB" dirty="0"/>
-              <a:t>Added code to make sure users agree to terms before 				  creating an account</a:t>
-            </a:r>
-          </a:p>
-          <a:p>
-            <a:endParaRPr lang="en-GB" dirty="0"/>
-          </a:p>
-        </p:txBody>
-      </p:sp>
-      <p:sp>
-        <p:nvSpPr>
-          <p:cNvPr id="7" name="Title 1">
+              <a:t>Felipe Cardoso - Contributions</a:t>
+            </a:r>
+            <a:endParaRPr lang="en-US" dirty="0"/>
+          </a:p>
+        </p:txBody>
+      </p:sp>
+      <p:sp>
+        <p:nvSpPr>
+          <p:cNvPr id="3" name="Content Placeholder 2">
             <a:extLst>
               <a:ext uri="{FF2B5EF4-FFF2-40B4-BE49-F238E27FC236}">
-                <a16:creationId xmlns:a16="http://schemas.microsoft.com/office/drawing/2014/main" xmlns="" id="{C419FCE0-6FCF-48A0-A380-503FFCF48BC5}"/>
+                <a16:creationId xmlns:a16="http://schemas.microsoft.com/office/drawing/2014/main" id="{D7B8B550-7412-9F4E-BF4D-500C6F52CE96}"/>
               </a:ext>
             </a:extLst>
           </p:cNvPr>
-          <p:cNvSpPr txBox="1">
-            <a:spLocks/>
-          </p:cNvSpPr>
-          <p:nvPr/>
-        </p:nvSpPr>
-        <p:spPr>
-          <a:xfrm>
-            <a:off x="1636711" y="838200"/>
-            <a:ext cx="10018713" cy="1752599"/>
-          </a:xfrm>
-          <a:prstGeom prst="rect">
-            <a:avLst/>
-          </a:prstGeom>
-          <a:effectLst/>
-        </p:spPr>
-        <p:txBody>
-          <a:bodyPr vert="horz" lIns="91440" tIns="45720" rIns="91440" bIns="45720" rtlCol="0" anchor="ctr">
-            <a:normAutofit/>
-          </a:bodyPr>
-          <a:lstStyle>
-            <a:lvl1pPr algn="ctr" defTabSz="457200" rtl="0" eaLnBrk="1" latinLnBrk="0" hangingPunct="1">
-              <a:spcBef>
-                <a:spcPct val="0"/>
-              </a:spcBef>
-              <a:buNone/>
-              <a:defRPr sz="4000" kern="1200" cap="none">
-                <a:ln w="3175" cmpd="sng">
-                  <a:noFill/>
-                </a:ln>
-                <a:solidFill>
-                  <a:schemeClr val="tx1"/>
-                </a:solidFill>
-                <a:effectLst/>
-                <a:latin typeface="+mj-lt"/>
-                <a:ea typeface="+mj-ea"/>
-                <a:cs typeface="+mj-cs"/>
-              </a:defRPr>
-            </a:lvl1pPr>
-            <a:lvl2pPr eaLnBrk="1" hangingPunct="1">
-              <a:defRPr>
-                <a:solidFill>
-                  <a:schemeClr val="tx2"/>
-                </a:solidFill>
-              </a:defRPr>
-            </a:lvl2pPr>
-            <a:lvl3pPr eaLnBrk="1" hangingPunct="1">
-              <a:defRPr>
-                <a:solidFill>
-                  <a:schemeClr val="tx2"/>
-                </a:solidFill>
-              </a:defRPr>
-            </a:lvl3pPr>
-            <a:lvl4pPr eaLnBrk="1" hangingPunct="1">
-              <a:defRPr>
-                <a:solidFill>
-                  <a:schemeClr val="tx2"/>
-                </a:solidFill>
-              </a:defRPr>
-            </a:lvl4pPr>
-            <a:lvl5pPr eaLnBrk="1" hangingPunct="1">
-              <a:defRPr>
-                <a:solidFill>
-                  <a:schemeClr val="tx2"/>
-                </a:solidFill>
-              </a:defRPr>
-            </a:lvl5pPr>
-            <a:lvl6pPr eaLnBrk="1" hangingPunct="1">
-              <a:defRPr>
-                <a:solidFill>
-                  <a:schemeClr val="tx2"/>
-                </a:solidFill>
-              </a:defRPr>
-            </a:lvl6pPr>
-            <a:lvl7pPr eaLnBrk="1" hangingPunct="1">
-              <a:defRPr>
-                <a:solidFill>
-                  <a:schemeClr val="tx2"/>
-                </a:solidFill>
-              </a:defRPr>
-            </a:lvl7pPr>
-            <a:lvl8pPr eaLnBrk="1" hangingPunct="1">
-              <a:defRPr>
-                <a:solidFill>
-                  <a:schemeClr val="tx2"/>
-                </a:solidFill>
-              </a:defRPr>
-            </a:lvl8pPr>
-            <a:lvl9pPr eaLnBrk="1" hangingPunct="1">
-              <a:defRPr>
-                <a:solidFill>
-                  <a:schemeClr val="tx2"/>
-                </a:solidFill>
-              </a:defRPr>
-            </a:lvl9pPr>
-          </a:lstStyle>
-          <a:p>
-            <a:r>
-              <a:rPr lang="en-GB" dirty="0"/>
-              <a:t>Camron Darpoh- Contributions</a:t>
-            </a:r>
-            <a:endParaRPr lang="en-US" dirty="0"/>
+          <p:cNvSpPr>
+            <a:spLocks noGrp="1"/>
+          </p:cNvSpPr>
+          <p:nvPr>
+            <p:ph idx="1"/>
+          </p:nvPr>
+        </p:nvSpPr>
+        <p:spPr/>
+        <p:txBody>
+          <a:bodyPr/>
+          <a:lstStyle/>
+          <a:p>
+            <a:r>
+              <a:rPr lang="en-US" dirty="0"/>
+              <a:t>Terms and Conditions for the app</a:t>
+            </a:r>
+          </a:p>
+          <a:p>
+            <a:r>
+              <a:rPr lang="en-US" dirty="0"/>
+              <a:t>Questionnaire for the extra features</a:t>
+            </a:r>
+          </a:p>
+          <a:p>
+            <a:r>
+              <a:rPr lang="en-US" dirty="0"/>
+              <a:t>Tried to do forgotten password</a:t>
+            </a:r>
           </a:p>
         </p:txBody>
       </p:sp>
     </p:spTree>
     <p:extLst>
       <p:ext uri="{BB962C8B-B14F-4D97-AF65-F5344CB8AC3E}">
-        <p14:creationId xmlns:p14="http://schemas.microsoft.com/office/powerpoint/2010/main" val="629018568"/>
+        <p14:creationId xmlns:p14="http://schemas.microsoft.com/office/powerpoint/2010/main" val="50700724"/>
       </p:ext>
     </p:extLst>
   </p:cSld>
@@ -8058,7 +8084,7 @@
           <p:cNvPr id="6" name="Content Placeholder 2">
             <a:extLst>
               <a:ext uri="{FF2B5EF4-FFF2-40B4-BE49-F238E27FC236}">
-                <a16:creationId xmlns:a16="http://schemas.microsoft.com/office/drawing/2014/main" xmlns="" id="{5DAF16B0-D37E-49FA-A8D2-E01E64B2DD62}"/>
+                <a16:creationId xmlns:a16="http://schemas.microsoft.com/office/drawing/2014/main" id="{5DAF16B0-D37E-49FA-A8D2-E01E64B2DD62}"/>
               </a:ext>
             </a:extLst>
           </p:cNvPr>
@@ -8083,35 +8109,20 @@
           <a:p>
             <a:r>
               <a:rPr lang="en-GB" dirty="0"/>
-              <a:t>Created Front End of the App</a:t>
+              <a:t>Wrote risk analysis for the project</a:t>
             </a:r>
           </a:p>
           <a:p>
             <a:r>
               <a:rPr lang="en-GB" dirty="0"/>
-              <a:t>Designed Class Diagram for the system</a:t>
+              <a:t>Implemented terms of service &amp; privacy policy on app</a:t>
             </a:r>
           </a:p>
           <a:p>
             <a:r>
               <a:rPr lang="en-GB" dirty="0"/>
-              <a:t>Coded the home page class (display timetable)</a:t>
-            </a:r>
-          </a:p>
-          <a:p>
-            <a:r>
-              <a:rPr lang="en-GB" dirty="0"/>
-              <a:t>Coded Map feature of the app</a:t>
-            </a:r>
-          </a:p>
-          <a:p>
-            <a:r>
-              <a:rPr lang="en-GB" dirty="0"/>
-              <a:t>Currently working on local database (Shared Preferences)</a:t>
-            </a:r>
-          </a:p>
-          <a:p>
-            <a:endParaRPr lang="en-GB" dirty="0"/>
+              <a:t>Added code to make sure users agree to terms before 				  creating an account</a:t>
+            </a:r>
           </a:p>
           <a:p>
             <a:endParaRPr lang="en-GB" dirty="0"/>
@@ -8123,7 +8134,7 @@
           <p:cNvPr id="7" name="Title 1">
             <a:extLst>
               <a:ext uri="{FF2B5EF4-FFF2-40B4-BE49-F238E27FC236}">
-                <a16:creationId xmlns:a16="http://schemas.microsoft.com/office/drawing/2014/main" xmlns="" id="{C419FCE0-6FCF-48A0-A380-503FFCF48BC5}"/>
+                <a16:creationId xmlns:a16="http://schemas.microsoft.com/office/drawing/2014/main" id="{C419FCE0-6FCF-48A0-A380-503FFCF48BC5}"/>
               </a:ext>
             </a:extLst>
           </p:cNvPr>
@@ -8225,7 +8236,7 @@
           <a:p>
             <a:r>
               <a:rPr lang="en-GB" dirty="0"/>
-              <a:t>Anas Zouhir - Contributions</a:t>
+              <a:t>Camron Darpoh- Contributions</a:t>
             </a:r>
             <a:endParaRPr lang="en-US" dirty="0"/>
           </a:p>
@@ -8234,7 +8245,7 @@
     </p:spTree>
     <p:extLst>
       <p:ext uri="{BB962C8B-B14F-4D97-AF65-F5344CB8AC3E}">
-        <p14:creationId xmlns:p14="http://schemas.microsoft.com/office/powerpoint/2010/main" val="2018138498"/>
+        <p14:creationId xmlns:p14="http://schemas.microsoft.com/office/powerpoint/2010/main" val="629018568"/>
       </p:ext>
     </p:extLst>
   </p:cSld>
@@ -8266,7 +8277,7 @@
           <p:cNvPr id="2" name="Title 1">
             <a:extLst>
               <a:ext uri="{FF2B5EF4-FFF2-40B4-BE49-F238E27FC236}">
-                <a16:creationId xmlns:a16="http://schemas.microsoft.com/office/drawing/2014/main" xmlns="" id="{07E3B652-4A10-44FD-8284-D61C580B6E0A}"/>
+                <a16:creationId xmlns:a16="http://schemas.microsoft.com/office/drawing/2014/main" id="{07E3B652-4A10-44FD-8284-D61C580B6E0A}"/>
               </a:ext>
             </a:extLst>
           </p:cNvPr>
@@ -8294,7 +8305,7 @@
           <p:cNvPr id="3" name="Content Placeholder 2">
             <a:extLst>
               <a:ext uri="{FF2B5EF4-FFF2-40B4-BE49-F238E27FC236}">
-                <a16:creationId xmlns:a16="http://schemas.microsoft.com/office/drawing/2014/main" xmlns="" id="{29FC2BB6-AFC0-4AE3-8AB1-692C1C22066C}"/>
+                <a16:creationId xmlns:a16="http://schemas.microsoft.com/office/drawing/2014/main" id="{29FC2BB6-AFC0-4AE3-8AB1-692C1C22066C}"/>
               </a:ext>
             </a:extLst>
           </p:cNvPr>
@@ -8367,7 +8378,7 @@
           <p:cNvPr id="4" name="Picture 3">
             <a:extLst>
               <a:ext uri="{FF2B5EF4-FFF2-40B4-BE49-F238E27FC236}">
-                <a16:creationId xmlns:a16="http://schemas.microsoft.com/office/drawing/2014/main" xmlns="" id="{9AEDE0A0-4D3B-40D4-88AE-D13D1FA63199}"/>
+                <a16:creationId xmlns:a16="http://schemas.microsoft.com/office/drawing/2014/main" id="{9AEDE0A0-4D3B-40D4-88AE-D13D1FA63199}"/>
               </a:ext>
             </a:extLst>
           </p:cNvPr>
@@ -8438,18 +8449,17 @@
           <a:lstStyle/>
           <a:p>
             <a:r>
-              <a:rPr lang="en-GB" dirty="0" smtClean="0"/>
-              <a:t>Tzu-</a:t>
-            </a:r>
-            <a:r>
-              <a:rPr lang="en-GB" dirty="0" err="1" smtClean="0"/>
+              <a:rPr lang="en-GB" dirty="0"/>
+              <a:t> (Anthony) Tzu-</a:t>
+            </a:r>
+            <a:r>
+              <a:rPr lang="en-GB" dirty="0" err="1"/>
               <a:t>LunYeh</a:t>
             </a:r>
             <a:r>
-              <a:rPr lang="en-GB" dirty="0" smtClean="0"/>
+              <a:rPr lang="en-GB" dirty="0"/>
               <a:t> - Contributions</a:t>
             </a:r>
-            <a:endParaRPr lang="en-GB" dirty="0"/>
           </a:p>
         </p:txBody>
       </p:sp>
@@ -8475,26 +8485,20 @@
           </a:p>
           <a:p>
             <a:r>
-              <a:rPr lang="en-GB" dirty="0" smtClean="0"/>
+              <a:rPr lang="en-GB" dirty="0"/>
               <a:t>Designed the GUI</a:t>
             </a:r>
-            <a:endParaRPr lang="en-GB" dirty="0"/>
-          </a:p>
-          <a:p>
-            <a:r>
-              <a:rPr lang="en-GB" dirty="0" smtClean="0"/>
+          </a:p>
+          <a:p>
+            <a:r>
+              <a:rPr lang="en-GB" dirty="0"/>
               <a:t>Tested the Login function</a:t>
             </a:r>
-            <a:endParaRPr lang="en-GB" dirty="0"/>
           </a:p>
           <a:p>
             <a:r>
               <a:rPr lang="en-GB" dirty="0"/>
-              <a:t>Testing of the </a:t>
-            </a:r>
-            <a:r>
-              <a:rPr lang="en-GB" dirty="0" smtClean="0"/>
-              <a:t>App</a:t>
+              <a:t>Testing of the App</a:t>
             </a:r>
           </a:p>
           <a:p>
@@ -8540,7 +8544,7 @@
           <p:cNvPr id="2" name="Title 1">
             <a:extLst>
               <a:ext uri="{FF2B5EF4-FFF2-40B4-BE49-F238E27FC236}">
-                <a16:creationId xmlns:a16="http://schemas.microsoft.com/office/drawing/2014/main" xmlns="" id="{5D7E2F9A-F273-45A3-8433-74CC65A5AB19}"/>
+                <a16:creationId xmlns:a16="http://schemas.microsoft.com/office/drawing/2014/main" id="{5D7E2F9A-F273-45A3-8433-74CC65A5AB19}"/>
               </a:ext>
             </a:extLst>
           </p:cNvPr>
@@ -8568,7 +8572,7 @@
           <p:cNvPr id="3" name="Content Placeholder 2">
             <a:extLst>
               <a:ext uri="{FF2B5EF4-FFF2-40B4-BE49-F238E27FC236}">
-                <a16:creationId xmlns:a16="http://schemas.microsoft.com/office/drawing/2014/main" xmlns="" id="{C825697C-6D72-4FA2-AF60-A51E0A830C0F}"/>
+                <a16:creationId xmlns:a16="http://schemas.microsoft.com/office/drawing/2014/main" id="{C825697C-6D72-4FA2-AF60-A51E0A830C0F}"/>
               </a:ext>
             </a:extLst>
           </p:cNvPr>
@@ -8636,7 +8640,7 @@
           <p:cNvPr id="4" name="Picture 3">
             <a:extLst>
               <a:ext uri="{FF2B5EF4-FFF2-40B4-BE49-F238E27FC236}">
-                <a16:creationId xmlns:a16="http://schemas.microsoft.com/office/drawing/2014/main" xmlns="" id="{895615A1-8ED0-4AFA-8EBC-97FF3474C2D6}"/>
+                <a16:creationId xmlns:a16="http://schemas.microsoft.com/office/drawing/2014/main" id="{895615A1-8ED0-4AFA-8EBC-97FF3474C2D6}"/>
               </a:ext>
             </a:extLst>
           </p:cNvPr>
@@ -8666,7 +8670,7 @@
           <p:cNvPr id="5" name="TextBox 4">
             <a:extLst>
               <a:ext uri="{FF2B5EF4-FFF2-40B4-BE49-F238E27FC236}">
-                <a16:creationId xmlns:a16="http://schemas.microsoft.com/office/drawing/2014/main" xmlns="" id="{42C3FC75-D871-4473-8D5B-0C6CA2ECC466}"/>
+                <a16:creationId xmlns:a16="http://schemas.microsoft.com/office/drawing/2014/main" id="{42C3FC75-D871-4473-8D5B-0C6CA2ECC466}"/>
               </a:ext>
             </a:extLst>
           </p:cNvPr>
@@ -8731,7 +8735,7 @@
           <p:cNvPr id="2" name="Title 1">
             <a:extLst>
               <a:ext uri="{FF2B5EF4-FFF2-40B4-BE49-F238E27FC236}">
-                <a16:creationId xmlns:a16="http://schemas.microsoft.com/office/drawing/2014/main" xmlns="" id="{5D7E2F9A-F273-45A3-8433-74CC65A5AB19}"/>
+                <a16:creationId xmlns:a16="http://schemas.microsoft.com/office/drawing/2014/main" id="{5D7E2F9A-F273-45A3-8433-74CC65A5AB19}"/>
               </a:ext>
             </a:extLst>
           </p:cNvPr>
@@ -8764,7 +8768,7 @@
           <p:cNvPr id="3" name="Content Placeholder 2">
             <a:extLst>
               <a:ext uri="{FF2B5EF4-FFF2-40B4-BE49-F238E27FC236}">
-                <a16:creationId xmlns:a16="http://schemas.microsoft.com/office/drawing/2014/main" xmlns="" id="{C825697C-6D72-4FA2-AF60-A51E0A830C0F}"/>
+                <a16:creationId xmlns:a16="http://schemas.microsoft.com/office/drawing/2014/main" id="{C825697C-6D72-4FA2-AF60-A51E0A830C0F}"/>
               </a:ext>
             </a:extLst>
           </p:cNvPr>
@@ -8802,7 +8806,7 @@
           <p:cNvPr id="5" name="TextBox 4">
             <a:extLst>
               <a:ext uri="{FF2B5EF4-FFF2-40B4-BE49-F238E27FC236}">
-                <a16:creationId xmlns:a16="http://schemas.microsoft.com/office/drawing/2014/main" xmlns="" id="{42C3FC75-D871-4473-8D5B-0C6CA2ECC466}"/>
+                <a16:creationId xmlns:a16="http://schemas.microsoft.com/office/drawing/2014/main" id="{42C3FC75-D871-4473-8D5B-0C6CA2ECC466}"/>
               </a:ext>
             </a:extLst>
           </p:cNvPr>
@@ -8837,7 +8841,7 @@
           <p:cNvPr id="6" name="Picture 5">
             <a:extLst>
               <a:ext uri="{FF2B5EF4-FFF2-40B4-BE49-F238E27FC236}">
-                <a16:creationId xmlns:a16="http://schemas.microsoft.com/office/drawing/2014/main" xmlns="" id="{0CC52FB0-AEEC-4E81-88EE-9AB1F7E96317}"/>
+                <a16:creationId xmlns:a16="http://schemas.microsoft.com/office/drawing/2014/main" id="{0CC52FB0-AEEC-4E81-88EE-9AB1F7E96317}"/>
               </a:ext>
             </a:extLst>
           </p:cNvPr>
@@ -8897,7 +8901,7 @@
           <p:cNvPr id="2" name="Title 1">
             <a:extLst>
               <a:ext uri="{FF2B5EF4-FFF2-40B4-BE49-F238E27FC236}">
-                <a16:creationId xmlns:a16="http://schemas.microsoft.com/office/drawing/2014/main" xmlns="" id="{5D7E2F9A-F273-45A3-8433-74CC65A5AB19}"/>
+                <a16:creationId xmlns:a16="http://schemas.microsoft.com/office/drawing/2014/main" id="{5D7E2F9A-F273-45A3-8433-74CC65A5AB19}"/>
               </a:ext>
             </a:extLst>
           </p:cNvPr>
@@ -8925,7 +8929,7 @@
           <p:cNvPr id="3" name="Content Placeholder 2">
             <a:extLst>
               <a:ext uri="{FF2B5EF4-FFF2-40B4-BE49-F238E27FC236}">
-                <a16:creationId xmlns:a16="http://schemas.microsoft.com/office/drawing/2014/main" xmlns="" id="{C825697C-6D72-4FA2-AF60-A51E0A830C0F}"/>
+                <a16:creationId xmlns:a16="http://schemas.microsoft.com/office/drawing/2014/main" id="{C825697C-6D72-4FA2-AF60-A51E0A830C0F}"/>
               </a:ext>
             </a:extLst>
           </p:cNvPr>
@@ -8990,7 +8994,7 @@
           <p:cNvPr id="4" name="TextBox 3">
             <a:extLst>
               <a:ext uri="{FF2B5EF4-FFF2-40B4-BE49-F238E27FC236}">
-                <a16:creationId xmlns:a16="http://schemas.microsoft.com/office/drawing/2014/main" xmlns="" id="{3B9B49CE-8BEC-412D-8506-A58B10F14730}"/>
+                <a16:creationId xmlns:a16="http://schemas.microsoft.com/office/drawing/2014/main" id="{3B9B49CE-8BEC-412D-8506-A58B10F14730}"/>
               </a:ext>
             </a:extLst>
           </p:cNvPr>
@@ -9055,7 +9059,7 @@
           <p:cNvPr id="2" name="Title 1">
             <a:extLst>
               <a:ext uri="{FF2B5EF4-FFF2-40B4-BE49-F238E27FC236}">
-                <a16:creationId xmlns:a16="http://schemas.microsoft.com/office/drawing/2014/main" xmlns="" id="{5D7E2F9A-F273-45A3-8433-74CC65A5AB19}"/>
+                <a16:creationId xmlns:a16="http://schemas.microsoft.com/office/drawing/2014/main" id="{5D7E2F9A-F273-45A3-8433-74CC65A5AB19}"/>
               </a:ext>
             </a:extLst>
           </p:cNvPr>
@@ -9083,7 +9087,7 @@
           <p:cNvPr id="4" name="TextBox 3">
             <a:extLst>
               <a:ext uri="{FF2B5EF4-FFF2-40B4-BE49-F238E27FC236}">
-                <a16:creationId xmlns:a16="http://schemas.microsoft.com/office/drawing/2014/main" xmlns="" id="{3B9B49CE-8BEC-412D-8506-A58B10F14730}"/>
+                <a16:creationId xmlns:a16="http://schemas.microsoft.com/office/drawing/2014/main" id="{3B9B49CE-8BEC-412D-8506-A58B10F14730}"/>
               </a:ext>
             </a:extLst>
           </p:cNvPr>
@@ -9118,7 +9122,7 @@
           <p:cNvPr id="5" name="Content Placeholder 2">
             <a:extLst>
               <a:ext uri="{FF2B5EF4-FFF2-40B4-BE49-F238E27FC236}">
-                <a16:creationId xmlns:a16="http://schemas.microsoft.com/office/drawing/2014/main" xmlns="" id="{02F00808-297E-48E7-837A-235C8243753E}"/>
+                <a16:creationId xmlns:a16="http://schemas.microsoft.com/office/drawing/2014/main" id="{02F00808-297E-48E7-837A-235C8243753E}"/>
               </a:ext>
             </a:extLst>
           </p:cNvPr>
@@ -9380,7 +9384,7 @@
           <p:cNvPr id="6" name="Content Placeholder 2">
             <a:extLst>
               <a:ext uri="{FF2B5EF4-FFF2-40B4-BE49-F238E27FC236}">
-                <a16:creationId xmlns:a16="http://schemas.microsoft.com/office/drawing/2014/main" xmlns="" id="{659A8E82-5F07-4BDA-BB38-AEA1E6860217}"/>
+                <a16:creationId xmlns:a16="http://schemas.microsoft.com/office/drawing/2014/main" id="{659A8E82-5F07-4BDA-BB38-AEA1E6860217}"/>
               </a:ext>
             </a:extLst>
           </p:cNvPr>
@@ -9699,7 +9703,7 @@
           <p:cNvPr id="2" name="Title 1">
             <a:extLst>
               <a:ext uri="{FF2B5EF4-FFF2-40B4-BE49-F238E27FC236}">
-                <a16:creationId xmlns:a16="http://schemas.microsoft.com/office/drawing/2014/main" xmlns="" id="{D79FD91B-EA38-46B5-A13B-90997DDB9ED8}"/>
+                <a16:creationId xmlns:a16="http://schemas.microsoft.com/office/drawing/2014/main" id="{D79FD91B-EA38-46B5-A13B-90997DDB9ED8}"/>
               </a:ext>
             </a:extLst>
           </p:cNvPr>
@@ -9732,7 +9736,7 @@
           <p:cNvPr id="3" name="Content Placeholder 2">
             <a:extLst>
               <a:ext uri="{FF2B5EF4-FFF2-40B4-BE49-F238E27FC236}">
-                <a16:creationId xmlns:a16="http://schemas.microsoft.com/office/drawing/2014/main" xmlns="" id="{51762B33-71DF-4AEB-B3B3-BFAB57DA0478}"/>
+                <a16:creationId xmlns:a16="http://schemas.microsoft.com/office/drawing/2014/main" id="{51762B33-71DF-4AEB-B3B3-BFAB57DA0478}"/>
               </a:ext>
             </a:extLst>
           </p:cNvPr>
@@ -9787,7 +9791,7 @@
           <p:cNvPr id="4" name="TextBox 3">
             <a:extLst>
               <a:ext uri="{FF2B5EF4-FFF2-40B4-BE49-F238E27FC236}">
-                <a16:creationId xmlns:a16="http://schemas.microsoft.com/office/drawing/2014/main" xmlns="" id="{B8AB9AB0-8CCD-4969-8D24-7B1789127845}"/>
+                <a16:creationId xmlns:a16="http://schemas.microsoft.com/office/drawing/2014/main" id="{B8AB9AB0-8CCD-4969-8D24-7B1789127845}"/>
               </a:ext>
             </a:extLst>
           </p:cNvPr>
@@ -9822,7 +9826,7 @@
           <p:cNvPr id="5" name="Picture 4">
             <a:extLst>
               <a:ext uri="{FF2B5EF4-FFF2-40B4-BE49-F238E27FC236}">
-                <a16:creationId xmlns:a16="http://schemas.microsoft.com/office/drawing/2014/main" xmlns="" id="{90483712-3F0F-4334-88F8-3A2D2E387DD8}"/>
+                <a16:creationId xmlns:a16="http://schemas.microsoft.com/office/drawing/2014/main" id="{90483712-3F0F-4334-88F8-3A2D2E387DD8}"/>
               </a:ext>
             </a:extLst>
           </p:cNvPr>
@@ -9852,7 +9856,7 @@
           <p:cNvPr id="6" name="Picture 5">
             <a:extLst>
               <a:ext uri="{FF2B5EF4-FFF2-40B4-BE49-F238E27FC236}">
-                <a16:creationId xmlns:a16="http://schemas.microsoft.com/office/drawing/2014/main" xmlns="" id="{85911FEB-852C-41E7-AE29-CA7526E818E0}"/>
+                <a16:creationId xmlns:a16="http://schemas.microsoft.com/office/drawing/2014/main" id="{85911FEB-852C-41E7-AE29-CA7526E818E0}"/>
               </a:ext>
             </a:extLst>
           </p:cNvPr>
@@ -9882,7 +9886,7 @@
           <p:cNvPr id="7" name="Picture 6">
             <a:extLst>
               <a:ext uri="{FF2B5EF4-FFF2-40B4-BE49-F238E27FC236}">
-                <a16:creationId xmlns:a16="http://schemas.microsoft.com/office/drawing/2014/main" xmlns="" id="{F16ADC3C-07A7-47D5-9A36-E47A7EA4672D}"/>
+                <a16:creationId xmlns:a16="http://schemas.microsoft.com/office/drawing/2014/main" id="{F16ADC3C-07A7-47D5-9A36-E47A7EA4672D}"/>
               </a:ext>
             </a:extLst>
           </p:cNvPr>
@@ -9942,7 +9946,7 @@
           <p:cNvPr id="2" name="Title 1">
             <a:extLst>
               <a:ext uri="{FF2B5EF4-FFF2-40B4-BE49-F238E27FC236}">
-                <a16:creationId xmlns:a16="http://schemas.microsoft.com/office/drawing/2014/main" xmlns="" id="{D79FD91B-EA38-46B5-A13B-90997DDB9ED8}"/>
+                <a16:creationId xmlns:a16="http://schemas.microsoft.com/office/drawing/2014/main" id="{D79FD91B-EA38-46B5-A13B-90997DDB9ED8}"/>
               </a:ext>
             </a:extLst>
           </p:cNvPr>
@@ -9975,7 +9979,7 @@
           <p:cNvPr id="3" name="Content Placeholder 2">
             <a:extLst>
               <a:ext uri="{FF2B5EF4-FFF2-40B4-BE49-F238E27FC236}">
-                <a16:creationId xmlns:a16="http://schemas.microsoft.com/office/drawing/2014/main" xmlns="" id="{51762B33-71DF-4AEB-B3B3-BFAB57DA0478}"/>
+                <a16:creationId xmlns:a16="http://schemas.microsoft.com/office/drawing/2014/main" id="{51762B33-71DF-4AEB-B3B3-BFAB57DA0478}"/>
               </a:ext>
             </a:extLst>
           </p:cNvPr>
@@ -10013,7 +10017,7 @@
           <p:cNvPr id="4" name="TextBox 3">
             <a:extLst>
               <a:ext uri="{FF2B5EF4-FFF2-40B4-BE49-F238E27FC236}">
-                <a16:creationId xmlns:a16="http://schemas.microsoft.com/office/drawing/2014/main" xmlns="" id="{B8AB9AB0-8CCD-4969-8D24-7B1789127845}"/>
+                <a16:creationId xmlns:a16="http://schemas.microsoft.com/office/drawing/2014/main" id="{B8AB9AB0-8CCD-4969-8D24-7B1789127845}"/>
               </a:ext>
             </a:extLst>
           </p:cNvPr>
@@ -10048,7 +10052,7 @@
           <p:cNvPr id="8" name="Picture 7">
             <a:extLst>
               <a:ext uri="{FF2B5EF4-FFF2-40B4-BE49-F238E27FC236}">
-                <a16:creationId xmlns:a16="http://schemas.microsoft.com/office/drawing/2014/main" xmlns="" id="{B409FB52-B2E0-483D-98A3-F780C5149109}"/>
+                <a16:creationId xmlns:a16="http://schemas.microsoft.com/office/drawing/2014/main" id="{B409FB52-B2E0-483D-98A3-F780C5149109}"/>
               </a:ext>
             </a:extLst>
           </p:cNvPr>
@@ -10108,7 +10112,7 @@
           <p:cNvPr id="2" name="Title 1">
             <a:extLst>
               <a:ext uri="{FF2B5EF4-FFF2-40B4-BE49-F238E27FC236}">
-                <a16:creationId xmlns:a16="http://schemas.microsoft.com/office/drawing/2014/main" xmlns="" id="{BF4991AD-78B0-4E30-9F62-F0BE8E8538E7}"/>
+                <a16:creationId xmlns:a16="http://schemas.microsoft.com/office/drawing/2014/main" id="{BF4991AD-78B0-4E30-9F62-F0BE8E8538E7}"/>
               </a:ext>
             </a:extLst>
           </p:cNvPr>
@@ -10141,7 +10145,7 @@
           <p:cNvPr id="4" name="TextBox 3">
             <a:extLst>
               <a:ext uri="{FF2B5EF4-FFF2-40B4-BE49-F238E27FC236}">
-                <a16:creationId xmlns:a16="http://schemas.microsoft.com/office/drawing/2014/main" xmlns="" id="{3BF79DCF-303A-48B3-9571-A0B6E8904DDD}"/>
+                <a16:creationId xmlns:a16="http://schemas.microsoft.com/office/drawing/2014/main" id="{3BF79DCF-303A-48B3-9571-A0B6E8904DDD}"/>
               </a:ext>
             </a:extLst>
           </p:cNvPr>
@@ -10176,7 +10180,7 @@
           <p:cNvPr id="6" name="Picture 5">
             <a:extLst>
               <a:ext uri="{FF2B5EF4-FFF2-40B4-BE49-F238E27FC236}">
-                <a16:creationId xmlns:a16="http://schemas.microsoft.com/office/drawing/2014/main" xmlns="" id="{6524731A-E5CE-4DA8-850E-1C2381EB97F9}"/>
+                <a16:creationId xmlns:a16="http://schemas.microsoft.com/office/drawing/2014/main" id="{6524731A-E5CE-4DA8-850E-1C2381EB97F9}"/>
               </a:ext>
             </a:extLst>
           </p:cNvPr>
@@ -10206,7 +10210,7 @@
           <p:cNvPr id="9" name="TextBox 8">
             <a:extLst>
               <a:ext uri="{FF2B5EF4-FFF2-40B4-BE49-F238E27FC236}">
-                <a16:creationId xmlns:a16="http://schemas.microsoft.com/office/drawing/2014/main" xmlns="" id="{93F268B6-F056-41E1-8AAE-2AE0DE412A47}"/>
+                <a16:creationId xmlns:a16="http://schemas.microsoft.com/office/drawing/2014/main" id="{93F268B6-F056-41E1-8AAE-2AE0DE412A47}"/>
               </a:ext>
             </a:extLst>
           </p:cNvPr>
@@ -10499,7 +10503,7 @@
   <a:extraClrSchemeLst/>
   <a:extLst>
     <a:ext uri="{05A4C25C-085E-4340-85A3-A5531E510DB2}">
-      <thm15:themeFamily xmlns:thm15="http://schemas.microsoft.com/office/thememl/2012/main" xmlns="" name="Parallax" id="{3388167B-A2EB-4685-9635-1831D9AEF8C4}" vid="{4F7A876A-7598-49CA-AFC8-8EDA2551E4A7}"/>
+      <thm15:themeFamily xmlns:thm15="http://schemas.microsoft.com/office/thememl/2012/main" name="Parallax" id="{3388167B-A2EB-4685-9635-1831D9AEF8C4}" vid="{4F7A876A-7598-49CA-AFC8-8EDA2551E4A7}"/>
     </a:ext>
   </a:extLst>
 </a:theme>

</xml_diff>